<commit_message>
Changes to program and files
</commit_message>
<xml_diff>
--- a/Data_Structures_C#_Training/Linear Data Structures.pptx
+++ b/Data_Structures_C#_Training/Linear Data Structures.pptx
@@ -6,15 +6,15 @@
   </p:sldMasterIdLst>
   <p:sldIdLst>
     <p:sldId id="256" r:id="rId2"/>
-    <p:sldId id="257" r:id="rId3"/>
-    <p:sldId id="258" r:id="rId4"/>
-    <p:sldId id="259" r:id="rId5"/>
-    <p:sldId id="263" r:id="rId6"/>
-    <p:sldId id="260" r:id="rId7"/>
-    <p:sldId id="261" r:id="rId8"/>
+    <p:sldId id="264" r:id="rId3"/>
+    <p:sldId id="257" r:id="rId4"/>
+    <p:sldId id="258" r:id="rId5"/>
+    <p:sldId id="259" r:id="rId6"/>
+    <p:sldId id="263" r:id="rId7"/>
+    <p:sldId id="260" r:id="rId8"/>
     <p:sldId id="265" r:id="rId9"/>
-    <p:sldId id="262" r:id="rId10"/>
-    <p:sldId id="264" r:id="rId11"/>
+    <p:sldId id="261" r:id="rId10"/>
+    <p:sldId id="262" r:id="rId11"/>
   </p:sldIdLst>
   <p:sldSz cx="9144000" cy="6858000" type="screen4x3"/>
   <p:notesSz cx="6858000" cy="9144000"/>
@@ -115,7 +115,7 @@
   </p:defaultTextStyle>
   <p:extLst>
     <p:ext uri="{EFAFB233-063F-42B5-8137-9DF3F51BA10A}">
-      <p15:sldGuideLst xmlns:p15="http://schemas.microsoft.com/office/powerpoint/2012/main">
+      <p15:sldGuideLst xmlns:p15="http://schemas.microsoft.com/office/powerpoint/2012/main" xmlns="">
         <p15:guide id="1" orient="horz" pos="2160">
           <p15:clr>
             <a:srgbClr val="A4A3A4"/>
@@ -3697,7 +3697,15 @@
             <a:pPr algn="ctr"/>
             <a:r>
               <a:rPr lang="en-US" sz="2800" dirty="0"/>
-              <a:t>Static List (Array), Linked List, Double Linked List, Stack, Queue, Priority Queue </a:t>
+              <a:t>Static List (Array), Linked List, Double Linked List, Stack</a:t>
+            </a:r>
+            <a:r>
+              <a:rPr lang="en-US" sz="2800"/>
+              <a:t>, </a:t>
+            </a:r>
+            <a:r>
+              <a:rPr lang="en-US" sz="2800" smtClean="0"/>
+              <a:t>Queue</a:t>
             </a:r>
             <a:endParaRPr lang="bg-BG" sz="2800" dirty="0"/>
           </a:p>
@@ -3733,13 +3741,7 @@
       </p:grpSpPr>
       <p:sp>
         <p:nvSpPr>
-          <p:cNvPr id="2" name="Title 1">
-            <a:extLst>
-              <a:ext uri="{FF2B5EF4-FFF2-40B4-BE49-F238E27FC236}">
-                <a16:creationId xmlns:a16="http://schemas.microsoft.com/office/drawing/2014/main" id="{A78343AF-F413-4ACF-8299-530AFC16D747}"/>
-              </a:ext>
-            </a:extLst>
-          </p:cNvPr>
+          <p:cNvPr id="2" name="Заглавие 1"/>
           <p:cNvSpPr>
             <a:spLocks noGrp="1"/>
           </p:cNvSpPr>
@@ -3752,48 +3754,16 @@
           <a:bodyPr/>
           <a:lstStyle/>
           <a:p>
-            <a:endParaRPr lang="en-US"/>
-          </a:p>
-        </p:txBody>
-      </p:sp>
-      <p:pic>
-        <p:nvPicPr>
-          <p:cNvPr id="4" name="Content Placeholder 3">
-            <a:extLst>
-              <a:ext uri="{FF2B5EF4-FFF2-40B4-BE49-F238E27FC236}">
-                <a16:creationId xmlns:a16="http://schemas.microsoft.com/office/drawing/2014/main" id="{07E85DD0-EAD9-4199-8771-CC6EBEB71FC3}"/>
-              </a:ext>
-            </a:extLst>
-          </p:cNvPr>
-          <p:cNvPicPr>
-            <a:picLocks noGrp="1" noChangeAspect="1"/>
-          </p:cNvPicPr>
-          <p:nvPr>
-            <p:ph idx="1"/>
-          </p:nvPr>
-        </p:nvPicPr>
-        <p:blipFill>
-          <a:blip r:embed="rId2"/>
-          <a:stretch>
-            <a:fillRect/>
-          </a:stretch>
-        </p:blipFill>
-        <p:spPr>
-          <a:xfrm>
-            <a:off x="700087" y="1897062"/>
-            <a:ext cx="7743825" cy="4543425"/>
-          </a:xfrm>
-          <a:prstGeom prst="rect">
-            <a:avLst/>
-          </a:prstGeom>
-        </p:spPr>
-      </p:pic>
+            <a:pPr algn="ctr"/>
+            <a:r>
+              <a:rPr lang="en-US" dirty="0"/>
+              <a:t>Questions</a:t>
+            </a:r>
+            <a:endParaRPr lang="bg-BG" dirty="0"/>
+          </a:p>
+        </p:txBody>
+      </p:sp>
     </p:spTree>
-    <p:extLst>
-      <p:ext uri="{BB962C8B-B14F-4D97-AF65-F5344CB8AC3E}">
-        <p14:creationId xmlns:p14="http://schemas.microsoft.com/office/powerpoint/2010/main" val="3040014443"/>
-      </p:ext>
-    </p:extLst>
   </p:cSld>
   <p:clrMapOvr>
     <a:masterClrMapping/>
@@ -3820,7 +3790,13 @@
       </p:grpSpPr>
       <p:sp>
         <p:nvSpPr>
-          <p:cNvPr id="2" name="Заглавие 1"/>
+          <p:cNvPr id="2" name="Title 1">
+            <a:extLst>
+              <a:ext uri="{FF2B5EF4-FFF2-40B4-BE49-F238E27FC236}">
+                <a16:creationId xmlns:a16="http://schemas.microsoft.com/office/drawing/2014/main" xmlns="" id="{A78343AF-F413-4ACF-8299-530AFC16D747}"/>
+              </a:ext>
+            </a:extLst>
+          </p:cNvPr>
           <p:cNvSpPr>
             <a:spLocks noGrp="1"/>
           </p:cNvSpPr>
@@ -3835,19 +3811,19 @@
           <a:p>
             <a:pPr algn="ctr"/>
             <a:r>
-              <a:rPr lang="en-US" dirty="0"/>
-              <a:t>Array List</a:t>
-            </a:r>
-            <a:endParaRPr lang="bg-BG" dirty="0"/>
+              <a:rPr lang="en-US" dirty="0" smtClean="0"/>
+              <a:t>What is complexity?</a:t>
+            </a:r>
+            <a:endParaRPr lang="en-US" dirty="0"/>
           </a:p>
         </p:txBody>
       </p:sp>
       <p:pic>
         <p:nvPicPr>
-          <p:cNvPr id="4" name="Content Placeholder 3">
+          <p:cNvPr id="6" name="Content Placeholder 3">
             <a:extLst>
               <a:ext uri="{FF2B5EF4-FFF2-40B4-BE49-F238E27FC236}">
-                <a16:creationId xmlns:a16="http://schemas.microsoft.com/office/drawing/2014/main" id="{8779BF08-4234-437E-8121-986FA0CF9158}"/>
+                <a16:creationId xmlns:a16="http://schemas.microsoft.com/office/drawing/2014/main" xmlns="" id="{07E85DD0-EAD9-4199-8771-CC6EBEB71FC3}"/>
               </a:ext>
             </a:extLst>
           </p:cNvPr>
@@ -3859,57 +3835,27 @@
           </p:nvPr>
         </p:nvPicPr>
         <p:blipFill>
-          <a:blip r:embed="rId2"/>
+          <a:blip r:embed="rId2" cstate="print"/>
           <a:stretch>
             <a:fillRect/>
           </a:stretch>
         </p:blipFill>
         <p:spPr>
           <a:xfrm>
-            <a:off x="2211586" y="2996952"/>
-            <a:ext cx="5648325" cy="552450"/>
+            <a:off x="700087" y="1897062"/>
+            <a:ext cx="7743825" cy="4543425"/>
           </a:xfrm>
           <a:prstGeom prst="rect">
             <a:avLst/>
           </a:prstGeom>
         </p:spPr>
       </p:pic>
-      <p:sp>
-        <p:nvSpPr>
-          <p:cNvPr id="5" name="TextBox 4">
-            <a:extLst>
-              <a:ext uri="{FF2B5EF4-FFF2-40B4-BE49-F238E27FC236}">
-                <a16:creationId xmlns:a16="http://schemas.microsoft.com/office/drawing/2014/main" id="{9CE22C41-B4A2-4D21-B9D4-02E7C547639D}"/>
-              </a:ext>
-            </a:extLst>
-          </p:cNvPr>
-          <p:cNvSpPr txBox="1"/>
-          <p:nvPr/>
-        </p:nvSpPr>
-        <p:spPr>
-          <a:xfrm>
-            <a:off x="2211586" y="1772816"/>
-            <a:ext cx="4896544" cy="369332"/>
-          </a:xfrm>
-          <a:prstGeom prst="rect">
-            <a:avLst/>
-          </a:prstGeom>
-          <a:noFill/>
-        </p:spPr>
-        <p:txBody>
-          <a:bodyPr wrap="square" rtlCol="0">
-            <a:spAutoFit/>
-          </a:bodyPr>
-          <a:lstStyle/>
-          <a:p>
-            <a:r>
-              <a:rPr lang="en-US" dirty="0"/>
-              <a:t>functions</a:t>
-            </a:r>
-          </a:p>
-        </p:txBody>
-      </p:sp>
     </p:spTree>
+    <p:extLst>
+      <p:ext uri="{BB962C8B-B14F-4D97-AF65-F5344CB8AC3E}">
+        <p14:creationId xmlns:p14="http://schemas.microsoft.com/office/powerpoint/2010/main" xmlns="" val="3040014443"/>
+      </p:ext>
+    </p:extLst>
   </p:cSld>
   <p:clrMapOvr>
     <a:masterClrMapping/>
@@ -3952,7 +3898,7 @@
             <a:pPr algn="ctr"/>
             <a:r>
               <a:rPr lang="en-US" dirty="0"/>
-              <a:t>Linked List</a:t>
+              <a:t>Array List</a:t>
             </a:r>
             <a:endParaRPr lang="bg-BG" dirty="0"/>
           </a:p>
@@ -3963,7 +3909,7 @@
           <p:cNvPr id="4" name="Content Placeholder 3">
             <a:extLst>
               <a:ext uri="{FF2B5EF4-FFF2-40B4-BE49-F238E27FC236}">
-                <a16:creationId xmlns:a16="http://schemas.microsoft.com/office/drawing/2014/main" id="{6EC99510-5730-4822-91DA-4ED47411A786}"/>
+                <a16:creationId xmlns:a16="http://schemas.microsoft.com/office/drawing/2014/main" xmlns="" id="{8779BF08-4234-437E-8121-986FA0CF9158}"/>
               </a:ext>
             </a:extLst>
           </p:cNvPr>
@@ -3975,15 +3921,15 @@
           </p:nvPr>
         </p:nvPicPr>
         <p:blipFill>
-          <a:blip r:embed="rId2"/>
+          <a:blip r:embed="rId2" cstate="print"/>
           <a:stretch>
             <a:fillRect/>
           </a:stretch>
         </p:blipFill>
         <p:spPr>
           <a:xfrm>
-            <a:off x="2657475" y="3287712"/>
-            <a:ext cx="3829050" cy="1762125"/>
+            <a:off x="1011618" y="4725144"/>
+            <a:ext cx="7120764" cy="696466"/>
           </a:xfrm>
           <a:prstGeom prst="rect">
             <a:avLst/>
@@ -3995,7 +3941,7 @@
           <p:cNvPr id="5" name="TextBox 4">
             <a:extLst>
               <a:ext uri="{FF2B5EF4-FFF2-40B4-BE49-F238E27FC236}">
-                <a16:creationId xmlns:a16="http://schemas.microsoft.com/office/drawing/2014/main" id="{C4D6F761-324A-494E-B985-A91D153BEEFE}"/>
+                <a16:creationId xmlns:a16="http://schemas.microsoft.com/office/drawing/2014/main" xmlns="" id="{9CE22C41-B4A2-4D21-B9D4-02E7C547639D}"/>
               </a:ext>
             </a:extLst>
           </p:cNvPr>
@@ -4004,8 +3950,8 @@
         </p:nvSpPr>
         <p:spPr>
           <a:xfrm>
-            <a:off x="3131840" y="1988840"/>
-            <a:ext cx="1194558" cy="369332"/>
+            <a:off x="3283781" y="1772816"/>
+            <a:ext cx="2576438" cy="1631216"/>
           </a:xfrm>
           <a:prstGeom prst="rect">
             <a:avLst/>
@@ -4013,14 +3959,44 @@
           <a:noFill/>
         </p:spPr>
         <p:txBody>
-          <a:bodyPr wrap="none" rtlCol="0">
+          <a:bodyPr wrap="square" rtlCol="0">
             <a:spAutoFit/>
           </a:bodyPr>
           <a:lstStyle/>
           <a:p>
             <a:r>
-              <a:rPr lang="en-US" dirty="0"/>
-              <a:t>functions</a:t>
+              <a:rPr lang="en-US" sz="2800" b="1" dirty="0" smtClean="0"/>
+              <a:t>Functions :</a:t>
+            </a:r>
+          </a:p>
+          <a:p>
+            <a:pPr>
+              <a:buFontTx/>
+              <a:buChar char="-"/>
+            </a:pPr>
+            <a:r>
+              <a:rPr lang="en-US" sz="2400" dirty="0" smtClean="0"/>
+              <a:t>Add</a:t>
+            </a:r>
+          </a:p>
+          <a:p>
+            <a:pPr>
+              <a:buFontTx/>
+              <a:buChar char="-"/>
+            </a:pPr>
+            <a:r>
+              <a:rPr lang="en-US" sz="2400" dirty="0" smtClean="0"/>
+              <a:t>Remove</a:t>
+            </a:r>
+          </a:p>
+          <a:p>
+            <a:pPr>
+              <a:buFontTx/>
+              <a:buChar char="-"/>
+            </a:pPr>
+            <a:r>
+              <a:rPr lang="en-US" sz="2400" dirty="0" smtClean="0"/>
+              <a:t>Get At Index</a:t>
             </a:r>
           </a:p>
         </p:txBody>
@@ -4060,7 +4036,12 @@
             <p:ph type="title"/>
           </p:nvPr>
         </p:nvSpPr>
-        <p:spPr/>
+        <p:spPr>
+          <a:xfrm>
+            <a:off x="457200" y="267494"/>
+            <a:ext cx="8229600" cy="1399032"/>
+          </a:xfrm>
+        </p:spPr>
         <p:txBody>
           <a:bodyPr/>
           <a:lstStyle/>
@@ -4068,36 +4049,106 @@
             <a:pPr algn="ctr"/>
             <a:r>
               <a:rPr lang="en-US" dirty="0"/>
-              <a:t>Array List </a:t>
-            </a:r>
-            <a:r>
-              <a:rPr lang="en-US" dirty="0" err="1"/>
-              <a:t>vs</a:t>
-            </a:r>
-            <a:r>
-              <a:rPr lang="en-US" dirty="0"/>
-              <a:t> Linked List</a:t>
+              <a:t>Linked List</a:t>
             </a:r>
             <a:endParaRPr lang="bg-BG" dirty="0"/>
           </a:p>
         </p:txBody>
       </p:sp>
-      <p:sp>
-        <p:nvSpPr>
-          <p:cNvPr id="3" name="Контейнер за съдържание 2"/>
-          <p:cNvSpPr>
-            <a:spLocks noGrp="1"/>
-          </p:cNvSpPr>
+      <p:pic>
+        <p:nvPicPr>
+          <p:cNvPr id="4" name="Content Placeholder 3">
+            <a:extLst>
+              <a:ext uri="{FF2B5EF4-FFF2-40B4-BE49-F238E27FC236}">
+                <a16:creationId xmlns:a16="http://schemas.microsoft.com/office/drawing/2014/main" xmlns="" id="{6EC99510-5730-4822-91DA-4ED47411A786}"/>
+              </a:ext>
+            </a:extLst>
+          </p:cNvPr>
+          <p:cNvPicPr>
+            <a:picLocks noGrp="1" noChangeAspect="1"/>
+          </p:cNvPicPr>
           <p:nvPr>
             <p:ph idx="1"/>
           </p:nvPr>
-        </p:nvSpPr>
-        <p:spPr/>
-        <p:txBody>
-          <a:bodyPr/>
+        </p:nvPicPr>
+        <p:blipFill>
+          <a:blip r:embed="rId2" cstate="print"/>
+          <a:stretch>
+            <a:fillRect/>
+          </a:stretch>
+        </p:blipFill>
+        <p:spPr>
+          <a:xfrm>
+            <a:off x="1907704" y="3573016"/>
+            <a:ext cx="5706707" cy="2626221"/>
+          </a:xfrm>
+          <a:prstGeom prst="rect">
+            <a:avLst/>
+          </a:prstGeom>
+        </p:spPr>
+      </p:pic>
+      <p:sp>
+        <p:nvSpPr>
+          <p:cNvPr id="5" name="TextBox 4">
+            <a:extLst>
+              <a:ext uri="{FF2B5EF4-FFF2-40B4-BE49-F238E27FC236}">
+                <a16:creationId xmlns:a16="http://schemas.microsoft.com/office/drawing/2014/main" xmlns="" id="{C4D6F761-324A-494E-B985-A91D153BEEFE}"/>
+              </a:ext>
+            </a:extLst>
+          </p:cNvPr>
+          <p:cNvSpPr txBox="1"/>
+          <p:nvPr/>
+        </p:nvSpPr>
+        <p:spPr>
+          <a:xfrm>
+            <a:off x="3412650" y="1556792"/>
+            <a:ext cx="2318701" cy="1631216"/>
+          </a:xfrm>
+          <a:prstGeom prst="rect">
+            <a:avLst/>
+          </a:prstGeom>
+          <a:noFill/>
+        </p:spPr>
+        <p:txBody>
+          <a:bodyPr wrap="square" rtlCol="0">
+            <a:spAutoFit/>
+          </a:bodyPr>
           <a:lstStyle/>
           <a:p>
-            <a:endParaRPr lang="bg-BG"/>
+            <a:r>
+              <a:rPr lang="en-US" sz="2800" b="1" dirty="0" smtClean="0"/>
+              <a:t>Functions :</a:t>
+            </a:r>
+          </a:p>
+          <a:p>
+            <a:pPr>
+              <a:buFontTx/>
+              <a:buChar char="-"/>
+            </a:pPr>
+            <a:r>
+              <a:rPr lang="en-US" sz="2400" dirty="0" smtClean="0"/>
+              <a:t>Add</a:t>
+            </a:r>
+          </a:p>
+          <a:p>
+            <a:pPr>
+              <a:buFontTx/>
+              <a:buChar char="-"/>
+            </a:pPr>
+            <a:r>
+              <a:rPr lang="en-US" sz="2400" dirty="0" smtClean="0"/>
+              <a:t>Remove</a:t>
+            </a:r>
+          </a:p>
+          <a:p>
+            <a:pPr>
+              <a:buFontTx/>
+              <a:buChar char="-"/>
+            </a:pPr>
+            <a:r>
+              <a:rPr lang="en-US" sz="2400" dirty="0" smtClean="0"/>
+              <a:t>Get At Index</a:t>
+            </a:r>
           </a:p>
         </p:txBody>
       </p:sp>
@@ -4144,7 +4195,15 @@
             <a:pPr algn="ctr"/>
             <a:r>
               <a:rPr lang="en-US" dirty="0"/>
-              <a:t>Double Linked List</a:t>
+              <a:t>Array List </a:t>
+            </a:r>
+            <a:r>
+              <a:rPr lang="en-US" dirty="0" err="1"/>
+              <a:t>vs</a:t>
+            </a:r>
+            <a:r>
+              <a:rPr lang="en-US" dirty="0"/>
+              <a:t> Linked List</a:t>
             </a:r>
             <a:endParaRPr lang="bg-BG" dirty="0"/>
           </a:p>
@@ -4155,7 +4214,7 @@
           <p:cNvPr id="4" name="Content Placeholder 3">
             <a:extLst>
               <a:ext uri="{FF2B5EF4-FFF2-40B4-BE49-F238E27FC236}">
-                <a16:creationId xmlns:a16="http://schemas.microsoft.com/office/drawing/2014/main" id="{727C5184-9C3D-4165-A46D-BAABF70B4DC2}"/>
+                <a16:creationId xmlns:a16="http://schemas.microsoft.com/office/drawing/2014/main" xmlns="" id="{FF5D4351-FEDD-472A-B5B4-BA92981190D0}"/>
               </a:ext>
             </a:extLst>
           </p:cNvPr>
@@ -4167,45 +4226,15 @@
           </p:nvPr>
         </p:nvPicPr>
         <p:blipFill>
-          <a:blip r:embed="rId2"/>
+          <a:blip r:embed="rId2" cstate="print"/>
           <a:stretch>
             <a:fillRect/>
           </a:stretch>
         </p:blipFill>
         <p:spPr>
           <a:xfrm>
-            <a:off x="1562100" y="4064000"/>
-            <a:ext cx="6019800" cy="209550"/>
-          </a:xfrm>
-          <a:prstGeom prst="rect">
-            <a:avLst/>
-          </a:prstGeom>
-        </p:spPr>
-      </p:pic>
-      <p:pic>
-        <p:nvPicPr>
-          <p:cNvPr id="5" name="Picture 4">
-            <a:extLst>
-              <a:ext uri="{FF2B5EF4-FFF2-40B4-BE49-F238E27FC236}">
-                <a16:creationId xmlns:a16="http://schemas.microsoft.com/office/drawing/2014/main" id="{9C8982CF-120C-4DF2-9B2D-4AC3C0B93AE7}"/>
-              </a:ext>
-            </a:extLst>
-          </p:cNvPr>
-          <p:cNvPicPr>
-            <a:picLocks noChangeAspect="1"/>
-          </p:cNvPicPr>
-          <p:nvPr/>
-        </p:nvPicPr>
-        <p:blipFill>
-          <a:blip r:embed="rId3"/>
-          <a:stretch>
-            <a:fillRect/>
-          </a:stretch>
-        </p:blipFill>
-        <p:spPr>
-          <a:xfrm>
-            <a:off x="1562101" y="3797300"/>
-            <a:ext cx="6019800" cy="266700"/>
+            <a:off x="971600" y="1700808"/>
+            <a:ext cx="7361329" cy="2856979"/>
           </a:xfrm>
           <a:prstGeom prst="rect">
             <a:avLst/>
@@ -4255,7 +4284,7 @@
             <a:pPr algn="ctr"/>
             <a:r>
               <a:rPr lang="en-US" dirty="0"/>
-              <a:t>Stack</a:t>
+              <a:t>Double Linked List</a:t>
             </a:r>
             <a:endParaRPr lang="bg-BG" dirty="0"/>
           </a:p>
@@ -4266,7 +4295,7 @@
           <p:cNvPr id="4" name="Content Placeholder 3">
             <a:extLst>
               <a:ext uri="{FF2B5EF4-FFF2-40B4-BE49-F238E27FC236}">
-                <a16:creationId xmlns:a16="http://schemas.microsoft.com/office/drawing/2014/main" id="{3F83DD62-E74F-4751-98A1-C37F844D6500}"/>
+                <a16:creationId xmlns:a16="http://schemas.microsoft.com/office/drawing/2014/main" xmlns="" id="{727C5184-9C3D-4165-A46D-BAABF70B4DC2}"/>
               </a:ext>
             </a:extLst>
           </p:cNvPr>
@@ -4278,15 +4307,15 @@
           </p:nvPr>
         </p:nvPicPr>
         <p:blipFill>
-          <a:blip r:embed="rId2"/>
+          <a:blip r:embed="rId2" cstate="print"/>
           <a:stretch>
             <a:fillRect/>
           </a:stretch>
         </p:blipFill>
         <p:spPr>
           <a:xfrm>
-            <a:off x="1320144" y="1882775"/>
-            <a:ext cx="6503712" cy="4572000"/>
+            <a:off x="467544" y="3933056"/>
+            <a:ext cx="8274364" cy="648072"/>
           </a:xfrm>
           <a:prstGeom prst="rect">
             <a:avLst/>
@@ -4298,7 +4327,7 @@
           <p:cNvPr id="5" name="Picture 4">
             <a:extLst>
               <a:ext uri="{FF2B5EF4-FFF2-40B4-BE49-F238E27FC236}">
-                <a16:creationId xmlns:a16="http://schemas.microsoft.com/office/drawing/2014/main" id="{063A6BFB-427E-4A5A-AD31-A007D36B06A5}"/>
+                <a16:creationId xmlns:a16="http://schemas.microsoft.com/office/drawing/2014/main" xmlns="" id="{9C8982CF-120C-4DF2-9B2D-4AC3C0B93AE7}"/>
               </a:ext>
             </a:extLst>
           </p:cNvPr>
@@ -4308,15 +4337,15 @@
           <p:nvPr/>
         </p:nvPicPr>
         <p:blipFill>
-          <a:blip r:embed="rId3"/>
+          <a:blip r:embed="rId3" cstate="print"/>
           <a:stretch>
             <a:fillRect/>
           </a:stretch>
         </p:blipFill>
         <p:spPr>
           <a:xfrm>
-            <a:off x="457200" y="403225"/>
-            <a:ext cx="3524250" cy="3295650"/>
+            <a:off x="467544" y="3429000"/>
+            <a:ext cx="8280920" cy="504512"/>
           </a:xfrm>
           <a:prstGeom prst="rect">
             <a:avLst/>
@@ -4325,20 +4354,14 @@
       </p:pic>
       <p:sp>
         <p:nvSpPr>
-          <p:cNvPr id="6" name="TextBox 5">
-            <a:extLst>
-              <a:ext uri="{FF2B5EF4-FFF2-40B4-BE49-F238E27FC236}">
-                <a16:creationId xmlns:a16="http://schemas.microsoft.com/office/drawing/2014/main" id="{19790F36-1E68-43D9-BBC5-6AFCC76B0B10}"/>
-              </a:ext>
-            </a:extLst>
-          </p:cNvPr>
+          <p:cNvPr id="6" name="Текстово поле 5"/>
           <p:cNvSpPr txBox="1"/>
           <p:nvPr/>
         </p:nvSpPr>
         <p:spPr>
           <a:xfrm>
-            <a:off x="6732240" y="1268760"/>
-            <a:ext cx="1194558" cy="369332"/>
+            <a:off x="283006" y="2276872"/>
+            <a:ext cx="8577989" cy="400110"/>
           </a:xfrm>
           <a:prstGeom prst="rect">
             <a:avLst/>
@@ -4352,10 +4375,10 @@
           <a:lstStyle/>
           <a:p>
             <a:r>
-              <a:rPr lang="en-GB" dirty="0"/>
-              <a:t>functions</a:t>
-            </a:r>
-            <a:endParaRPr lang="en-US" dirty="0"/>
+              <a:rPr lang="en-US" sz="2000" dirty="0" smtClean="0"/>
+              <a:t>What’s the difference between single linked and double linked list ?</a:t>
+            </a:r>
+            <a:endParaRPr lang="bg-BG" sz="2000" dirty="0"/>
           </a:p>
         </p:txBody>
       </p:sp>
@@ -4402,35 +4425,7 @@
             <a:pPr algn="ctr"/>
             <a:r>
               <a:rPr lang="en-US" dirty="0"/>
-              <a:t>Queue</a:t>
-            </a:r>
-            <a:endParaRPr lang="bg-BG" dirty="0"/>
-          </a:p>
-        </p:txBody>
-      </p:sp>
-      <p:sp>
-        <p:nvSpPr>
-          <p:cNvPr id="3" name="Контейнер за съдържание 2"/>
-          <p:cNvSpPr>
-            <a:spLocks noGrp="1"/>
-          </p:cNvSpPr>
-          <p:nvPr>
-            <p:ph idx="1"/>
-          </p:nvPr>
-        </p:nvSpPr>
-        <p:spPr>
-          <a:xfrm>
-            <a:off x="929193" y="3429000"/>
-            <a:ext cx="8229600" cy="4572000"/>
-          </a:xfrm>
-        </p:spPr>
-        <p:txBody>
-          <a:bodyPr/>
-          <a:lstStyle/>
-          <a:p>
-            <a:r>
-              <a:rPr lang="en-GB" dirty="0"/>
-              <a:t>functions</a:t>
+              <a:t>Stack</a:t>
             </a:r>
             <a:endParaRPr lang="bg-BG" dirty="0"/>
           </a:p>
@@ -4438,34 +4433,101 @@
       </p:sp>
       <p:pic>
         <p:nvPicPr>
-          <p:cNvPr id="4" name="Picture 3">
+          <p:cNvPr id="4" name="Content Placeholder 3">
             <a:extLst>
               <a:ext uri="{FF2B5EF4-FFF2-40B4-BE49-F238E27FC236}">
-                <a16:creationId xmlns:a16="http://schemas.microsoft.com/office/drawing/2014/main" id="{35469BF4-8D70-482A-9EE2-A7281880628C}"/>
+                <a16:creationId xmlns:a16="http://schemas.microsoft.com/office/drawing/2014/main" xmlns="" id="{3F83DD62-E74F-4751-98A1-C37F844D6500}"/>
               </a:ext>
             </a:extLst>
           </p:cNvPr>
           <p:cNvPicPr>
-            <a:picLocks noChangeAspect="1"/>
+            <a:picLocks noGrp="1" noChangeAspect="1"/>
           </p:cNvPicPr>
-          <p:nvPr/>
+          <p:nvPr>
+            <p:ph idx="1"/>
+          </p:nvPr>
         </p:nvPicPr>
         <p:blipFill>
-          <a:blip r:embed="rId2"/>
+          <a:blip r:embed="rId2" cstate="print"/>
           <a:stretch>
             <a:fillRect/>
           </a:stretch>
         </p:blipFill>
         <p:spPr>
           <a:xfrm>
-            <a:off x="899592" y="1484784"/>
-            <a:ext cx="5019675" cy="1590675"/>
+            <a:off x="2406012" y="3429000"/>
+            <a:ext cx="4331976" cy="3045306"/>
           </a:xfrm>
           <a:prstGeom prst="rect">
             <a:avLst/>
           </a:prstGeom>
         </p:spPr>
       </p:pic>
+      <p:sp>
+        <p:nvSpPr>
+          <p:cNvPr id="8" name="TextBox 4">
+            <a:extLst>
+              <a:ext uri="{FF2B5EF4-FFF2-40B4-BE49-F238E27FC236}">
+                <a16:creationId xmlns:a16="http://schemas.microsoft.com/office/drawing/2014/main" xmlns="" id="{9CE22C41-B4A2-4D21-B9D4-02E7C547639D}"/>
+              </a:ext>
+            </a:extLst>
+          </p:cNvPr>
+          <p:cNvSpPr txBox="1"/>
+          <p:nvPr/>
+        </p:nvSpPr>
+        <p:spPr>
+          <a:xfrm>
+            <a:off x="3275856" y="1484784"/>
+            <a:ext cx="2576438" cy="1631216"/>
+          </a:xfrm>
+          <a:prstGeom prst="rect">
+            <a:avLst/>
+          </a:prstGeom>
+          <a:noFill/>
+        </p:spPr>
+        <p:txBody>
+          <a:bodyPr wrap="square" rtlCol="0">
+            <a:spAutoFit/>
+          </a:bodyPr>
+          <a:lstStyle/>
+          <a:p>
+            <a:r>
+              <a:rPr lang="en-US" sz="2800" b="1" dirty="0" smtClean="0"/>
+              <a:t>Functions :</a:t>
+            </a:r>
+          </a:p>
+          <a:p>
+            <a:pPr>
+              <a:buFontTx/>
+              <a:buChar char="-"/>
+            </a:pPr>
+            <a:r>
+              <a:rPr lang="en-US" sz="2400" dirty="0" smtClean="0"/>
+              <a:t>Push</a:t>
+            </a:r>
+          </a:p>
+          <a:p>
+            <a:pPr>
+              <a:buFontTx/>
+              <a:buChar char="-"/>
+            </a:pPr>
+            <a:r>
+              <a:rPr lang="en-US" sz="2400" dirty="0" smtClean="0"/>
+              <a:t>Pop</a:t>
+            </a:r>
+          </a:p>
+          <a:p>
+            <a:pPr>
+              <a:buFontTx/>
+              <a:buChar char="-"/>
+            </a:pPr>
+            <a:r>
+              <a:rPr lang="en-US" sz="2400" dirty="0" smtClean="0"/>
+              <a:t>Top/Peek</a:t>
+            </a:r>
+          </a:p>
+        </p:txBody>
+      </p:sp>
     </p:spTree>
   </p:cSld>
   <p:clrMapOvr>
@@ -4491,37 +4553,12 @@
           <a:chExt cx="0" cy="0"/>
         </a:xfrm>
       </p:grpSpPr>
-      <p:sp>
-        <p:nvSpPr>
-          <p:cNvPr id="2" name="Title 1">
+      <p:pic>
+        <p:nvPicPr>
+          <p:cNvPr id="4" name="Picture 4">
             <a:extLst>
               <a:ext uri="{FF2B5EF4-FFF2-40B4-BE49-F238E27FC236}">
-                <a16:creationId xmlns:a16="http://schemas.microsoft.com/office/drawing/2014/main" id="{80E06EE4-BCB6-411B-8586-69C1833756C9}"/>
-              </a:ext>
-            </a:extLst>
-          </p:cNvPr>
-          <p:cNvSpPr>
-            <a:spLocks noGrp="1"/>
-          </p:cNvSpPr>
-          <p:nvPr>
-            <p:ph type="title"/>
-          </p:nvPr>
-        </p:nvSpPr>
-        <p:spPr/>
-        <p:txBody>
-          <a:bodyPr/>
-          <a:lstStyle/>
-          <a:p>
-            <a:endParaRPr lang="en-US"/>
-          </a:p>
-        </p:txBody>
-      </p:sp>
-      <p:pic>
-        <p:nvPicPr>
-          <p:cNvPr id="4" name="Content Placeholder 3">
-            <a:extLst>
-              <a:ext uri="{FF2B5EF4-FFF2-40B4-BE49-F238E27FC236}">
-                <a16:creationId xmlns:a16="http://schemas.microsoft.com/office/drawing/2014/main" id="{FF5D4351-FEDD-472A-B5B4-BA92981190D0}"/>
+                <a16:creationId xmlns:a16="http://schemas.microsoft.com/office/drawing/2014/main" xmlns="" id="{063A6BFB-427E-4A5A-AD31-A007D36B06A5}"/>
               </a:ext>
             </a:extLst>
           </p:cNvPr>
@@ -4533,15 +4570,15 @@
           </p:nvPr>
         </p:nvPicPr>
         <p:blipFill>
-          <a:blip r:embed="rId2"/>
+          <a:blip r:embed="rId2" cstate="print"/>
           <a:stretch>
             <a:fillRect/>
           </a:stretch>
         </p:blipFill>
         <p:spPr>
           <a:xfrm>
-            <a:off x="1528762" y="2987675"/>
-            <a:ext cx="6086475" cy="2362200"/>
+            <a:off x="2123728" y="1196752"/>
+            <a:ext cx="4930477" cy="4610662"/>
           </a:xfrm>
           <a:prstGeom prst="rect">
             <a:avLst/>
@@ -4549,11 +4586,6 @@
         </p:spPr>
       </p:pic>
     </p:spTree>
-    <p:extLst>
-      <p:ext uri="{BB962C8B-B14F-4D97-AF65-F5344CB8AC3E}">
-        <p14:creationId xmlns:p14="http://schemas.microsoft.com/office/powerpoint/2010/main" val="619127440"/>
-      </p:ext>
-    </p:extLst>
   </p:cSld>
   <p:clrMapOvr>
     <a:masterClrMapping/>
@@ -4596,28 +4628,116 @@
             <a:pPr algn="ctr"/>
             <a:r>
               <a:rPr lang="en-US" dirty="0"/>
-              <a:t>Questions</a:t>
+              <a:t>Queue</a:t>
             </a:r>
             <a:endParaRPr lang="bg-BG" dirty="0"/>
           </a:p>
         </p:txBody>
       </p:sp>
-      <p:sp>
-        <p:nvSpPr>
-          <p:cNvPr id="3" name="Контейнер за съдържание 2"/>
-          <p:cNvSpPr>
-            <a:spLocks noGrp="1"/>
-          </p:cNvSpPr>
-          <p:nvPr>
-            <p:ph idx="1"/>
-          </p:nvPr>
-        </p:nvSpPr>
-        <p:spPr/>
-        <p:txBody>
-          <a:bodyPr/>
+      <p:pic>
+        <p:nvPicPr>
+          <p:cNvPr id="4" name="Picture 3">
+            <a:extLst>
+              <a:ext uri="{FF2B5EF4-FFF2-40B4-BE49-F238E27FC236}">
+                <a16:creationId xmlns:a16="http://schemas.microsoft.com/office/drawing/2014/main" xmlns="" id="{35469BF4-8D70-482A-9EE2-A7281880628C}"/>
+              </a:ext>
+            </a:extLst>
+          </p:cNvPr>
+          <p:cNvPicPr>
+            <a:picLocks noChangeAspect="1"/>
+          </p:cNvPicPr>
+          <p:nvPr/>
+        </p:nvPicPr>
+        <p:blipFill>
+          <a:blip r:embed="rId2" cstate="print"/>
+          <a:stretch>
+            <a:fillRect/>
+          </a:stretch>
+        </p:blipFill>
+        <p:spPr>
+          <a:xfrm>
+            <a:off x="1439652" y="1484784"/>
+            <a:ext cx="6264696" cy="1985207"/>
+          </a:xfrm>
+          <a:prstGeom prst="rect">
+            <a:avLst/>
+          </a:prstGeom>
+        </p:spPr>
+      </p:pic>
+      <p:sp>
+        <p:nvSpPr>
+          <p:cNvPr id="5" name="TextBox 4">
+            <a:extLst>
+              <a:ext uri="{FF2B5EF4-FFF2-40B4-BE49-F238E27FC236}">
+                <a16:creationId xmlns:a16="http://schemas.microsoft.com/office/drawing/2014/main" xmlns="" id="{9CE22C41-B4A2-4D21-B9D4-02E7C547639D}"/>
+              </a:ext>
+            </a:extLst>
+          </p:cNvPr>
+          <p:cNvSpPr txBox="1"/>
+          <p:nvPr/>
+        </p:nvSpPr>
+        <p:spPr>
+          <a:xfrm>
+            <a:off x="2987824" y="3933056"/>
+            <a:ext cx="2576438" cy="2000548"/>
+          </a:xfrm>
+          <a:prstGeom prst="rect">
+            <a:avLst/>
+          </a:prstGeom>
+          <a:noFill/>
+        </p:spPr>
+        <p:txBody>
+          <a:bodyPr wrap="square" rtlCol="0">
+            <a:spAutoFit/>
+          </a:bodyPr>
           <a:lstStyle/>
           <a:p>
-            <a:endParaRPr lang="bg-BG"/>
+            <a:r>
+              <a:rPr lang="en-US" sz="2800" b="1" dirty="0" smtClean="0"/>
+              <a:t>Functions :</a:t>
+            </a:r>
+          </a:p>
+          <a:p>
+            <a:pPr>
+              <a:buFontTx/>
+              <a:buChar char="-"/>
+            </a:pPr>
+            <a:r>
+              <a:rPr lang="en-US" sz="2400" dirty="0" err="1" smtClean="0"/>
+              <a:t>Enqueue</a:t>
+            </a:r>
+            <a:endParaRPr lang="en-US" sz="2400" dirty="0" smtClean="0"/>
+          </a:p>
+          <a:p>
+            <a:pPr>
+              <a:buFontTx/>
+              <a:buChar char="-"/>
+            </a:pPr>
+            <a:r>
+              <a:rPr lang="en-US" sz="2400" dirty="0" err="1" smtClean="0"/>
+              <a:t>Dequeue</a:t>
+            </a:r>
+            <a:endParaRPr lang="en-US" sz="2400" dirty="0" smtClean="0"/>
+          </a:p>
+          <a:p>
+            <a:pPr>
+              <a:buFontTx/>
+              <a:buChar char="-"/>
+            </a:pPr>
+            <a:r>
+              <a:rPr lang="en-US" sz="2400" dirty="0" smtClean="0"/>
+              <a:t>Front</a:t>
+            </a:r>
+          </a:p>
+          <a:p>
+            <a:pPr>
+              <a:buFontTx/>
+              <a:buChar char="-"/>
+            </a:pPr>
+            <a:r>
+              <a:rPr lang="en-US" sz="2400" dirty="0" smtClean="0"/>
+              <a:t>Back</a:t>
+            </a:r>
           </a:p>
         </p:txBody>
       </p:sp>

</xml_diff>